<commit_message>
@merge de branches/0.7c.3-mutant com alterações locais
</commit_message>
<xml_diff>
--- a/images/logo/logo.pptx
+++ b/images/logo/logo.pptx
@@ -288,7 +288,7 @@
           <a:p>
             <a:fld id="{01632F01-47C7-45BE-9740-031A27127240}" type="datetimeFigureOut">
               <a:rPr lang="pt-BR" smtClean="0"/>
-              <a:t>09/07/2013</a:t>
+              <a:t>18/09/2014</a:t>
             </a:fld>
             <a:endParaRPr lang="pt-BR"/>
           </a:p>
@@ -458,7 +458,7 @@
           <a:p>
             <a:fld id="{01632F01-47C7-45BE-9740-031A27127240}" type="datetimeFigureOut">
               <a:rPr lang="pt-BR" smtClean="0"/>
-              <a:t>09/07/2013</a:t>
+              <a:t>18/09/2014</a:t>
             </a:fld>
             <a:endParaRPr lang="pt-BR"/>
           </a:p>
@@ -638,7 +638,7 @@
           <a:p>
             <a:fld id="{01632F01-47C7-45BE-9740-031A27127240}" type="datetimeFigureOut">
               <a:rPr lang="pt-BR" smtClean="0"/>
-              <a:t>09/07/2013</a:t>
+              <a:t>18/09/2014</a:t>
             </a:fld>
             <a:endParaRPr lang="pt-BR"/>
           </a:p>
@@ -808,7 +808,7 @@
           <a:p>
             <a:fld id="{01632F01-47C7-45BE-9740-031A27127240}" type="datetimeFigureOut">
               <a:rPr lang="pt-BR" smtClean="0"/>
-              <a:t>09/07/2013</a:t>
+              <a:t>18/09/2014</a:t>
             </a:fld>
             <a:endParaRPr lang="pt-BR"/>
           </a:p>
@@ -1054,7 +1054,7 @@
           <a:p>
             <a:fld id="{01632F01-47C7-45BE-9740-031A27127240}" type="datetimeFigureOut">
               <a:rPr lang="pt-BR" smtClean="0"/>
-              <a:t>09/07/2013</a:t>
+              <a:t>18/09/2014</a:t>
             </a:fld>
             <a:endParaRPr lang="pt-BR"/>
           </a:p>
@@ -1342,7 +1342,7 @@
           <a:p>
             <a:fld id="{01632F01-47C7-45BE-9740-031A27127240}" type="datetimeFigureOut">
               <a:rPr lang="pt-BR" smtClean="0"/>
-              <a:t>09/07/2013</a:t>
+              <a:t>18/09/2014</a:t>
             </a:fld>
             <a:endParaRPr lang="pt-BR"/>
           </a:p>
@@ -1764,7 +1764,7 @@
           <a:p>
             <a:fld id="{01632F01-47C7-45BE-9740-031A27127240}" type="datetimeFigureOut">
               <a:rPr lang="pt-BR" smtClean="0"/>
-              <a:t>09/07/2013</a:t>
+              <a:t>18/09/2014</a:t>
             </a:fld>
             <a:endParaRPr lang="pt-BR"/>
           </a:p>
@@ -1882,7 +1882,7 @@
           <a:p>
             <a:fld id="{01632F01-47C7-45BE-9740-031A27127240}" type="datetimeFigureOut">
               <a:rPr lang="pt-BR" smtClean="0"/>
-              <a:t>09/07/2013</a:t>
+              <a:t>18/09/2014</a:t>
             </a:fld>
             <a:endParaRPr lang="pt-BR"/>
           </a:p>
@@ -1977,7 +1977,7 @@
           <a:p>
             <a:fld id="{01632F01-47C7-45BE-9740-031A27127240}" type="datetimeFigureOut">
               <a:rPr lang="pt-BR" smtClean="0"/>
-              <a:t>09/07/2013</a:t>
+              <a:t>18/09/2014</a:t>
             </a:fld>
             <a:endParaRPr lang="pt-BR"/>
           </a:p>
@@ -2254,7 +2254,7 @@
           <a:p>
             <a:fld id="{01632F01-47C7-45BE-9740-031A27127240}" type="datetimeFigureOut">
               <a:rPr lang="pt-BR" smtClean="0"/>
-              <a:t>09/07/2013</a:t>
+              <a:t>18/09/2014</a:t>
             </a:fld>
             <a:endParaRPr lang="pt-BR"/>
           </a:p>
@@ -2507,7 +2507,7 @@
           <a:p>
             <a:fld id="{01632F01-47C7-45BE-9740-031A27127240}" type="datetimeFigureOut">
               <a:rPr lang="pt-BR" smtClean="0"/>
-              <a:t>09/07/2013</a:t>
+              <a:t>18/09/2014</a:t>
             </a:fld>
             <a:endParaRPr lang="pt-BR"/>
           </a:p>
@@ -2720,7 +2720,7 @@
           <a:p>
             <a:fld id="{01632F01-47C7-45BE-9740-031A27127240}" type="datetimeFigureOut">
               <a:rPr lang="pt-BR" smtClean="0"/>
-              <a:t>09/07/2013</a:t>
+              <a:t>18/09/2014</a:t>
             </a:fld>
             <a:endParaRPr lang="pt-BR"/>
           </a:p>
@@ -3095,336 +3095,364 @@
           <a:chExt cx="0" cy="0"/>
         </a:xfrm>
       </p:grpSpPr>
-      <p:sp>
-        <p:nvSpPr>
-          <p:cNvPr id="4" name="Elipse 3"/>
-          <p:cNvSpPr/>
+      <p:grpSp>
+        <p:nvGrpSpPr>
+          <p:cNvPr id="2" name="Grupo 1"/>
+          <p:cNvGrpSpPr/>
           <p:nvPr/>
-        </p:nvSpPr>
-        <p:spPr>
+        </p:nvGrpSpPr>
+        <p:grpSpPr>
           <a:xfrm>
-            <a:off x="3563888" y="2132856"/>
-            <a:ext cx="1800200" cy="1800200"/>
+            <a:off x="3046133" y="2105962"/>
+            <a:ext cx="3051733" cy="2691190"/>
+            <a:chOff x="3046133" y="2105962"/>
+            <a:chExt cx="3051733" cy="2691190"/>
           </a:xfrm>
-          <a:prstGeom prst="ellipse">
-            <a:avLst/>
-          </a:prstGeom>
-          <a:solidFill>
-            <a:schemeClr val="accent6"/>
-          </a:solidFill>
-          <a:ln>
+        </p:grpSpPr>
+        <p:sp>
+          <p:nvSpPr>
+            <p:cNvPr id="4" name="Elipse 3"/>
+            <p:cNvSpPr/>
+            <p:nvPr/>
+          </p:nvSpPr>
+          <p:spPr>
+            <a:xfrm>
+              <a:off x="3563888" y="2132856"/>
+              <a:ext cx="1800200" cy="1800200"/>
+            </a:xfrm>
+            <a:prstGeom prst="ellipse">
+              <a:avLst/>
+            </a:prstGeom>
             <a:solidFill>
               <a:schemeClr val="accent6"/>
             </a:solidFill>
-          </a:ln>
-        </p:spPr>
-        <p:style>
-          <a:lnRef idx="2">
-            <a:schemeClr val="dk1">
-              <a:shade val="50000"/>
-            </a:schemeClr>
-          </a:lnRef>
-          <a:fillRef idx="1">
-            <a:schemeClr val="dk1"/>
-          </a:fillRef>
-          <a:effectRef idx="0">
-            <a:schemeClr val="dk1"/>
-          </a:effectRef>
-          <a:fontRef idx="minor">
-            <a:schemeClr val="lt1"/>
-          </a:fontRef>
-        </p:style>
-        <p:txBody>
-          <a:bodyPr rtlCol="0" anchor="ctr"/>
-          <a:lstStyle/>
-          <a:p>
-            <a:pPr algn="ctr"/>
-            <a:endParaRPr lang="pt-BR"/>
-          </a:p>
-        </p:txBody>
-      </p:sp>
-      <p:sp>
-        <p:nvSpPr>
-          <p:cNvPr id="5" name="Elipse 4"/>
-          <p:cNvSpPr/>
-          <p:nvPr/>
-        </p:nvSpPr>
-        <p:spPr>
-          <a:xfrm>
-            <a:off x="3744888" y="2209056"/>
-            <a:ext cx="1791816" cy="1647800"/>
-          </a:xfrm>
-          <a:prstGeom prst="ellipse">
-            <a:avLst/>
-          </a:prstGeom>
-          <a:solidFill>
-            <a:schemeClr val="bg1"/>
-          </a:solidFill>
-          <a:ln>
-            <a:noFill/>
-          </a:ln>
-        </p:spPr>
-        <p:style>
-          <a:lnRef idx="2">
-            <a:schemeClr val="dk1">
-              <a:shade val="50000"/>
-            </a:schemeClr>
-          </a:lnRef>
-          <a:fillRef idx="1">
-            <a:schemeClr val="dk1"/>
-          </a:fillRef>
-          <a:effectRef idx="0">
-            <a:schemeClr val="dk1"/>
-          </a:effectRef>
-          <a:fontRef idx="minor">
-            <a:schemeClr val="lt1"/>
-          </a:fontRef>
-        </p:style>
-        <p:txBody>
-          <a:bodyPr rtlCol="0" anchor="ctr"/>
-          <a:lstStyle/>
-          <a:p>
-            <a:pPr algn="ctr"/>
-            <a:endParaRPr lang="pt-BR"/>
-          </a:p>
-        </p:txBody>
-      </p:sp>
-      <p:sp>
-        <p:nvSpPr>
-          <p:cNvPr id="6" name="Elipse 5"/>
-          <p:cNvSpPr/>
-          <p:nvPr/>
-        </p:nvSpPr>
-        <p:spPr>
-          <a:xfrm rot="10800000">
-            <a:off x="3911547" y="2304317"/>
-            <a:ext cx="1452541" cy="1457277"/>
-          </a:xfrm>
-          <a:prstGeom prst="ellipse">
-            <a:avLst/>
-          </a:prstGeom>
-          <a:solidFill>
-            <a:schemeClr val="bg1">
-              <a:lumMod val="50000"/>
-            </a:schemeClr>
-          </a:solidFill>
-          <a:ln>
+            <a:ln>
+              <a:solidFill>
+                <a:schemeClr val="accent6"/>
+              </a:solidFill>
+            </a:ln>
+          </p:spPr>
+          <p:style>
+            <a:lnRef idx="2">
+              <a:schemeClr val="dk1">
+                <a:shade val="50000"/>
+              </a:schemeClr>
+            </a:lnRef>
+            <a:fillRef idx="1">
+              <a:schemeClr val="dk1"/>
+            </a:fillRef>
+            <a:effectRef idx="0">
+              <a:schemeClr val="dk1"/>
+            </a:effectRef>
+            <a:fontRef idx="minor">
+              <a:schemeClr val="lt1"/>
+            </a:fontRef>
+          </p:style>
+          <p:txBody>
+            <a:bodyPr rtlCol="0" anchor="ctr"/>
+            <a:lstStyle/>
+            <a:p>
+              <a:pPr algn="ctr"/>
+              <a:endParaRPr lang="pt-BR"/>
+            </a:p>
+          </p:txBody>
+        </p:sp>
+        <p:sp>
+          <p:nvSpPr>
+            <p:cNvPr id="5" name="Elipse 4"/>
+            <p:cNvSpPr/>
+            <p:nvPr/>
+          </p:nvSpPr>
+          <p:spPr>
+            <a:xfrm>
+              <a:off x="3744888" y="2209056"/>
+              <a:ext cx="1791816" cy="1647800"/>
+            </a:xfrm>
+            <a:prstGeom prst="ellipse">
+              <a:avLst/>
+            </a:prstGeom>
+            <a:solidFill>
+              <a:schemeClr val="bg1"/>
+            </a:solidFill>
+            <a:ln>
+              <a:noFill/>
+            </a:ln>
+          </p:spPr>
+          <p:style>
+            <a:lnRef idx="2">
+              <a:schemeClr val="dk1">
+                <a:shade val="50000"/>
+              </a:schemeClr>
+            </a:lnRef>
+            <a:fillRef idx="1">
+              <a:schemeClr val="dk1"/>
+            </a:fillRef>
+            <a:effectRef idx="0">
+              <a:schemeClr val="dk1"/>
+            </a:effectRef>
+            <a:fontRef idx="minor">
+              <a:schemeClr val="lt1"/>
+            </a:fontRef>
+          </p:style>
+          <p:txBody>
+            <a:bodyPr rtlCol="0" anchor="ctr"/>
+            <a:lstStyle/>
+            <a:p>
+              <a:pPr algn="ctr"/>
+              <a:endParaRPr lang="pt-BR"/>
+            </a:p>
+          </p:txBody>
+        </p:sp>
+        <p:sp>
+          <p:nvSpPr>
+            <p:cNvPr id="6" name="Elipse 5"/>
+            <p:cNvSpPr/>
+            <p:nvPr/>
+          </p:nvSpPr>
+          <p:spPr>
+            <a:xfrm rot="10800000">
+              <a:off x="3911547" y="2304317"/>
+              <a:ext cx="1452541" cy="1457277"/>
+            </a:xfrm>
+            <a:prstGeom prst="ellipse">
+              <a:avLst/>
+            </a:prstGeom>
             <a:solidFill>
               <a:schemeClr val="bg1">
                 <a:lumMod val="50000"/>
               </a:schemeClr>
             </a:solidFill>
-          </a:ln>
-        </p:spPr>
-        <p:style>
-          <a:lnRef idx="2">
-            <a:schemeClr val="dk1">
-              <a:shade val="50000"/>
-            </a:schemeClr>
-          </a:lnRef>
-          <a:fillRef idx="1">
-            <a:schemeClr val="dk1"/>
-          </a:fillRef>
-          <a:effectRef idx="0">
-            <a:schemeClr val="dk1"/>
-          </a:effectRef>
-          <a:fontRef idx="minor">
-            <a:schemeClr val="lt1"/>
-          </a:fontRef>
-        </p:style>
-        <p:txBody>
-          <a:bodyPr rtlCol="0" anchor="ctr"/>
-          <a:lstStyle/>
-          <a:p>
-            <a:pPr algn="ctr"/>
-            <a:endParaRPr lang="pt-BR"/>
-          </a:p>
-        </p:txBody>
-      </p:sp>
-      <p:sp>
-        <p:nvSpPr>
-          <p:cNvPr id="7" name="Elipse 6"/>
-          <p:cNvSpPr/>
-          <p:nvPr/>
-        </p:nvSpPr>
-        <p:spPr>
-          <a:xfrm rot="10800000">
-            <a:off x="3737312" y="2351486"/>
-            <a:ext cx="1445776" cy="1333908"/>
-          </a:xfrm>
-          <a:prstGeom prst="ellipse">
-            <a:avLst/>
-          </a:prstGeom>
-          <a:solidFill>
-            <a:schemeClr val="bg1"/>
-          </a:solidFill>
-          <a:ln>
+            <a:ln>
+              <a:solidFill>
+                <a:schemeClr val="bg1">
+                  <a:lumMod val="50000"/>
+                </a:schemeClr>
+              </a:solidFill>
+            </a:ln>
+          </p:spPr>
+          <p:style>
+            <a:lnRef idx="2">
+              <a:schemeClr val="dk1">
+                <a:shade val="50000"/>
+              </a:schemeClr>
+            </a:lnRef>
+            <a:fillRef idx="1">
+              <a:schemeClr val="dk1"/>
+            </a:fillRef>
+            <a:effectRef idx="0">
+              <a:schemeClr val="dk1"/>
+            </a:effectRef>
+            <a:fontRef idx="minor">
+              <a:schemeClr val="lt1"/>
+            </a:fontRef>
+          </p:style>
+          <p:txBody>
+            <a:bodyPr rtlCol="0" anchor="ctr"/>
+            <a:lstStyle/>
+            <a:p>
+              <a:pPr algn="ctr"/>
+              <a:endParaRPr lang="pt-BR"/>
+            </a:p>
+          </p:txBody>
+        </p:sp>
+        <p:sp>
+          <p:nvSpPr>
+            <p:cNvPr id="7" name="Elipse 6"/>
+            <p:cNvSpPr/>
+            <p:nvPr/>
+          </p:nvSpPr>
+          <p:spPr>
+            <a:xfrm rot="10800000">
+              <a:off x="3737312" y="2351486"/>
+              <a:ext cx="1445776" cy="1333908"/>
+            </a:xfrm>
+            <a:prstGeom prst="ellipse">
+              <a:avLst/>
+            </a:prstGeom>
+            <a:solidFill>
+              <a:schemeClr val="bg1"/>
+            </a:solidFill>
+            <a:ln>
+              <a:noFill/>
+            </a:ln>
+          </p:spPr>
+          <p:style>
+            <a:lnRef idx="2">
+              <a:schemeClr val="dk1">
+                <a:shade val="50000"/>
+              </a:schemeClr>
+            </a:lnRef>
+            <a:fillRef idx="1">
+              <a:schemeClr val="dk1"/>
+            </a:fillRef>
+            <a:effectRef idx="0">
+              <a:schemeClr val="dk1"/>
+            </a:effectRef>
+            <a:fontRef idx="minor">
+              <a:schemeClr val="lt1"/>
+            </a:fontRef>
+          </p:style>
+          <p:txBody>
+            <a:bodyPr rtlCol="0" anchor="ctr"/>
+            <a:lstStyle/>
+            <a:p>
+              <a:pPr algn="ctr"/>
+              <a:endParaRPr lang="pt-BR"/>
+            </a:p>
+          </p:txBody>
+        </p:sp>
+        <p:sp>
+          <p:nvSpPr>
+            <p:cNvPr id="52" name="Forma livre 51"/>
+            <p:cNvSpPr/>
+            <p:nvPr/>
+          </p:nvSpPr>
+          <p:spPr>
+            <a:xfrm>
+              <a:off x="3899646" y="2105962"/>
+              <a:ext cx="1810871" cy="1488141"/>
+            </a:xfrm>
+            <a:custGeom>
+              <a:avLst/>
+              <a:gdLst>
+                <a:gd name="connsiteX0" fmla="*/ 672353 w 1810871"/>
+                <a:gd name="connsiteY0" fmla="*/ 1488141 h 1488141"/>
+                <a:gd name="connsiteX1" fmla="*/ 1810871 w 1810871"/>
+                <a:gd name="connsiteY1" fmla="*/ 0 h 1488141"/>
+                <a:gd name="connsiteX2" fmla="*/ 1255059 w 1810871"/>
+                <a:gd name="connsiteY2" fmla="*/ 8964 h 1488141"/>
+                <a:gd name="connsiteX3" fmla="*/ 681318 w 1810871"/>
+                <a:gd name="connsiteY3" fmla="*/ 1030941 h 1488141"/>
+                <a:gd name="connsiteX4" fmla="*/ 430306 w 1810871"/>
+                <a:gd name="connsiteY4" fmla="*/ 618564 h 1488141"/>
+                <a:gd name="connsiteX5" fmla="*/ 0 w 1810871"/>
+                <a:gd name="connsiteY5" fmla="*/ 618564 h 1488141"/>
+                <a:gd name="connsiteX6" fmla="*/ 672353 w 1810871"/>
+                <a:gd name="connsiteY6" fmla="*/ 1488141 h 1488141"/>
+              </a:gdLst>
+              <a:ahLst/>
+              <a:cxnLst>
+                <a:cxn ang="0">
+                  <a:pos x="connsiteX0" y="connsiteY0"/>
+                </a:cxn>
+                <a:cxn ang="0">
+                  <a:pos x="connsiteX1" y="connsiteY1"/>
+                </a:cxn>
+                <a:cxn ang="0">
+                  <a:pos x="connsiteX2" y="connsiteY2"/>
+                </a:cxn>
+                <a:cxn ang="0">
+                  <a:pos x="connsiteX3" y="connsiteY3"/>
+                </a:cxn>
+                <a:cxn ang="0">
+                  <a:pos x="connsiteX4" y="connsiteY4"/>
+                </a:cxn>
+                <a:cxn ang="0">
+                  <a:pos x="connsiteX5" y="connsiteY5"/>
+                </a:cxn>
+                <a:cxn ang="0">
+                  <a:pos x="connsiteX6" y="connsiteY6"/>
+                </a:cxn>
+              </a:cxnLst>
+              <a:rect l="l" t="t" r="r" b="b"/>
+              <a:pathLst>
+                <a:path w="1810871" h="1488141">
+                  <a:moveTo>
+                    <a:pt x="672353" y="1488141"/>
+                  </a:moveTo>
+                  <a:lnTo>
+                    <a:pt x="1810871" y="0"/>
+                  </a:lnTo>
+                  <a:lnTo>
+                    <a:pt x="1255059" y="8964"/>
+                  </a:lnTo>
+                  <a:lnTo>
+                    <a:pt x="681318" y="1030941"/>
+                  </a:lnTo>
+                  <a:lnTo>
+                    <a:pt x="430306" y="618564"/>
+                  </a:lnTo>
+                  <a:lnTo>
+                    <a:pt x="0" y="618564"/>
+                  </a:lnTo>
+                  <a:lnTo>
+                    <a:pt x="672353" y="1488141"/>
+                  </a:lnTo>
+                  <a:close/>
+                </a:path>
+              </a:pathLst>
+            </a:custGeom>
+            <a:solidFill>
+              <a:srgbClr val="9CBC5C"/>
+            </a:solidFill>
+            <a:ln w="28575">
+              <a:noFill/>
+            </a:ln>
+          </p:spPr>
+          <p:style>
+            <a:lnRef idx="2">
+              <a:schemeClr val="accent1">
+                <a:shade val="50000"/>
+              </a:schemeClr>
+            </a:lnRef>
+            <a:fillRef idx="1">
+              <a:schemeClr val="accent1"/>
+            </a:fillRef>
+            <a:effectRef idx="0">
+              <a:schemeClr val="accent1"/>
+            </a:effectRef>
+            <a:fontRef idx="minor">
+              <a:schemeClr val="lt1"/>
+            </a:fontRef>
+          </p:style>
+          <p:txBody>
+            <a:bodyPr rtlCol="0" anchor="ctr"/>
+            <a:lstStyle/>
+            <a:p>
+              <a:pPr algn="ctr"/>
+              <a:endParaRPr lang="pt-BR"/>
+            </a:p>
+          </p:txBody>
+        </p:sp>
+        <p:sp>
+          <p:nvSpPr>
+            <p:cNvPr id="53" name="Retângulo 52"/>
+            <p:cNvSpPr/>
+            <p:nvPr/>
+          </p:nvSpPr>
+          <p:spPr>
+            <a:xfrm>
+              <a:off x="3046133" y="3873822"/>
+              <a:ext cx="3051733" cy="923330"/>
+            </a:xfrm>
+            <a:prstGeom prst="rect">
+              <a:avLst/>
+            </a:prstGeom>
             <a:noFill/>
-          </a:ln>
-        </p:spPr>
-        <p:style>
-          <a:lnRef idx="2">
-            <a:schemeClr val="dk1">
-              <a:shade val="50000"/>
-            </a:schemeClr>
-          </a:lnRef>
-          <a:fillRef idx="1">
-            <a:schemeClr val="dk1"/>
-          </a:fillRef>
-          <a:effectRef idx="0">
-            <a:schemeClr val="dk1"/>
-          </a:effectRef>
-          <a:fontRef idx="minor">
-            <a:schemeClr val="lt1"/>
-          </a:fontRef>
-        </p:style>
-        <p:txBody>
-          <a:bodyPr rtlCol="0" anchor="ctr"/>
-          <a:lstStyle/>
-          <a:p>
-            <a:pPr algn="ctr"/>
-            <a:endParaRPr lang="pt-BR"/>
-          </a:p>
-        </p:txBody>
-      </p:sp>
-      <p:sp>
-        <p:nvSpPr>
-          <p:cNvPr id="52" name="Forma livre 51"/>
-          <p:cNvSpPr/>
-          <p:nvPr/>
-        </p:nvSpPr>
-        <p:spPr>
-          <a:xfrm>
-            <a:off x="3899646" y="2105962"/>
-            <a:ext cx="1810871" cy="1488141"/>
-          </a:xfrm>
-          <a:custGeom>
-            <a:avLst/>
-            <a:gdLst>
-              <a:gd name="connsiteX0" fmla="*/ 672353 w 1810871"/>
-              <a:gd name="connsiteY0" fmla="*/ 1488141 h 1488141"/>
-              <a:gd name="connsiteX1" fmla="*/ 1810871 w 1810871"/>
-              <a:gd name="connsiteY1" fmla="*/ 0 h 1488141"/>
-              <a:gd name="connsiteX2" fmla="*/ 1255059 w 1810871"/>
-              <a:gd name="connsiteY2" fmla="*/ 8964 h 1488141"/>
-              <a:gd name="connsiteX3" fmla="*/ 681318 w 1810871"/>
-              <a:gd name="connsiteY3" fmla="*/ 1030941 h 1488141"/>
-              <a:gd name="connsiteX4" fmla="*/ 430306 w 1810871"/>
-              <a:gd name="connsiteY4" fmla="*/ 618564 h 1488141"/>
-              <a:gd name="connsiteX5" fmla="*/ 0 w 1810871"/>
-              <a:gd name="connsiteY5" fmla="*/ 618564 h 1488141"/>
-              <a:gd name="connsiteX6" fmla="*/ 672353 w 1810871"/>
-              <a:gd name="connsiteY6" fmla="*/ 1488141 h 1488141"/>
-            </a:gdLst>
-            <a:ahLst/>
-            <a:cxnLst>
-              <a:cxn ang="0">
-                <a:pos x="connsiteX0" y="connsiteY0"/>
-              </a:cxn>
-              <a:cxn ang="0">
-                <a:pos x="connsiteX1" y="connsiteY1"/>
-              </a:cxn>
-              <a:cxn ang="0">
-                <a:pos x="connsiteX2" y="connsiteY2"/>
-              </a:cxn>
-              <a:cxn ang="0">
-                <a:pos x="connsiteX3" y="connsiteY3"/>
-              </a:cxn>
-              <a:cxn ang="0">
-                <a:pos x="connsiteX4" y="connsiteY4"/>
-              </a:cxn>
-              <a:cxn ang="0">
-                <a:pos x="connsiteX5" y="connsiteY5"/>
-              </a:cxn>
-              <a:cxn ang="0">
-                <a:pos x="connsiteX6" y="connsiteY6"/>
-              </a:cxn>
-            </a:cxnLst>
-            <a:rect l="l" t="t" r="r" b="b"/>
-            <a:pathLst>
-              <a:path w="1810871" h="1488141">
-                <a:moveTo>
-                  <a:pt x="672353" y="1488141"/>
-                </a:moveTo>
-                <a:lnTo>
-                  <a:pt x="1810871" y="0"/>
-                </a:lnTo>
-                <a:lnTo>
-                  <a:pt x="1255059" y="8964"/>
-                </a:lnTo>
-                <a:lnTo>
-                  <a:pt x="681318" y="1030941"/>
-                </a:lnTo>
-                <a:lnTo>
-                  <a:pt x="430306" y="618564"/>
-                </a:lnTo>
-                <a:lnTo>
-                  <a:pt x="0" y="618564"/>
-                </a:lnTo>
-                <a:lnTo>
-                  <a:pt x="672353" y="1488141"/>
-                </a:lnTo>
-                <a:close/>
-              </a:path>
-            </a:pathLst>
-          </a:custGeom>
-          <a:solidFill>
-            <a:srgbClr val="9CBC5C"/>
-          </a:solidFill>
-          <a:ln w="28575">
-            <a:noFill/>
-          </a:ln>
-        </p:spPr>
-        <p:style>
-          <a:lnRef idx="2">
-            <a:schemeClr val="accent1">
-              <a:shade val="50000"/>
-            </a:schemeClr>
-          </a:lnRef>
-          <a:fillRef idx="1">
-            <a:schemeClr val="accent1"/>
-          </a:fillRef>
-          <a:effectRef idx="0">
-            <a:schemeClr val="accent1"/>
-          </a:effectRef>
-          <a:fontRef idx="minor">
-            <a:schemeClr val="lt1"/>
-          </a:fontRef>
-        </p:style>
-        <p:txBody>
-          <a:bodyPr rtlCol="0" anchor="ctr"/>
-          <a:lstStyle/>
-          <a:p>
-            <a:pPr algn="ctr"/>
-            <a:endParaRPr lang="pt-BR"/>
-          </a:p>
-        </p:txBody>
-      </p:sp>
-      <p:sp>
-        <p:nvSpPr>
-          <p:cNvPr id="53" name="Retângulo 52"/>
-          <p:cNvSpPr/>
-          <p:nvPr/>
-        </p:nvSpPr>
-        <p:spPr>
-          <a:xfrm>
-            <a:off x="3046133" y="3873822"/>
-            <a:ext cx="3051733" cy="923330"/>
-          </a:xfrm>
-          <a:prstGeom prst="rect">
-            <a:avLst/>
-          </a:prstGeom>
-          <a:noFill/>
-        </p:spPr>
-        <p:txBody>
-          <a:bodyPr wrap="none" lIns="91440" tIns="45720" rIns="91440" bIns="45720">
-            <a:spAutoFit/>
-          </a:bodyPr>
-          <a:lstStyle/>
-          <a:p>
-            <a:pPr algn="ctr"/>
-            <a:r>
-              <a:rPr lang="pt-BR" sz="5400" b="1" dirty="0" err="1" smtClean="0">
+          </p:spPr>
+          <p:txBody>
+            <a:bodyPr wrap="none" lIns="91440" tIns="45720" rIns="91440" bIns="45720">
+              <a:spAutoFit/>
+            </a:bodyPr>
+            <a:lstStyle/>
+            <a:p>
+              <a:pPr algn="ctr"/>
+              <a:r>
+                <a:rPr lang="pt-BR" sz="5400" b="1" dirty="0" err="1" smtClean="0">
+                  <a:ln w="9000" cmpd="sng">
+                    <a:solidFill>
+                      <a:srgbClr val="9CBC5C"/>
+                    </a:solidFill>
+                    <a:prstDash val="solid"/>
+                  </a:ln>
+                  <a:solidFill>
+                    <a:srgbClr val="9CBC5C"/>
+                  </a:solidFill>
+                  <a:effectLst/>
+                </a:rPr>
+                <a:t>FunTester</a:t>
+              </a:r>
+              <a:endParaRPr lang="pt-BR" sz="5400" b="1" dirty="0">
                 <a:ln w="9000" cmpd="sng">
                   <a:solidFill>
                     <a:srgbClr val="9CBC5C"/>
@@ -3435,24 +3463,11 @@
                   <a:srgbClr val="9CBC5C"/>
                 </a:solidFill>
                 <a:effectLst/>
-              </a:rPr>
-              <a:t>FunTester</a:t>
-            </a:r>
-            <a:endParaRPr lang="pt-BR" sz="5400" b="1" dirty="0">
-              <a:ln w="9000" cmpd="sng">
-                <a:solidFill>
-                  <a:srgbClr val="9CBC5C"/>
-                </a:solidFill>
-                <a:prstDash val="solid"/>
-              </a:ln>
-              <a:solidFill>
-                <a:srgbClr val="9CBC5C"/>
-              </a:solidFill>
-              <a:effectLst/>
-            </a:endParaRPr>
-          </a:p>
-        </p:txBody>
-      </p:sp>
+              </a:endParaRPr>
+            </a:p>
+          </p:txBody>
+        </p:sp>
+      </p:grpSp>
     </p:spTree>
     <p:extLst>
       <p:ext uri="{BB962C8B-B14F-4D97-AF65-F5344CB8AC3E}">

</xml_diff>